<commit_message>
Added in 6 weeks of content as templates
</commit_message>
<xml_diff>
--- a/GAM320/02/20-21-GAM320-02-Manifesto.pptx
+++ b/GAM320/02/20-21-GAM320-02-Manifesto.pptx
@@ -228,7 +228,7 @@
             <a:fld id="{134C908B-E4CF-4B88-8994-49C91B4DAC10}" type="datetimeFigureOut">
               <a:rPr lang="en-US" smtClean="0"/>
               <a:pPr/>
-              <a:t>9/9/2020</a:t>
+              <a:t>9/11/2020</a:t>
             </a:fld>
             <a:endParaRPr lang="en-US"/>
           </a:p>
@@ -395,7 +395,7 @@
             <a:fld id="{FCD4ED34-E2A7-4A73-B53B-08CB721EE63F}" type="datetimeFigureOut">
               <a:rPr lang="en-US" smtClean="0"/>
               <a:pPr/>
-              <a:t>9/9/2020</a:t>
+              <a:t>9/11/2020</a:t>
             </a:fld>
             <a:endParaRPr lang="en-GB"/>
           </a:p>
@@ -1028,7 +1028,7 @@
             <a:fld id="{24C0EDFE-3590-4448-BF7B-7FB41E82085F}" type="datetimeFigureOut">
               <a:rPr lang="en-US" smtClean="0"/>
               <a:pPr/>
-              <a:t>9/9/2020</a:t>
+              <a:t>9/11/2020</a:t>
             </a:fld>
             <a:endParaRPr lang="en-US" dirty="0"/>
           </a:p>
@@ -1259,7 +1259,7 @@
             <a:fld id="{24C0EDFE-3590-4448-BF7B-7FB41E82085F}" type="datetimeFigureOut">
               <a:rPr lang="en-US" smtClean="0"/>
               <a:pPr/>
-              <a:t>9/9/2020</a:t>
+              <a:t>9/11/2020</a:t>
             </a:fld>
             <a:endParaRPr lang="en-US" dirty="0"/>
           </a:p>
@@ -1625,7 +1625,7 @@
             <a:fld id="{24C0EDFE-3590-4448-BF7B-7FB41E82085F}" type="datetimeFigureOut">
               <a:rPr lang="en-US" smtClean="0"/>
               <a:pPr/>
-              <a:t>9/9/2020</a:t>
+              <a:t>9/11/2020</a:t>
             </a:fld>
             <a:endParaRPr lang="en-US" dirty="0"/>
           </a:p>
@@ -1939,7 +1939,7 @@
             <a:fld id="{24C0EDFE-3590-4448-BF7B-7FB41E82085F}" type="datetimeFigureOut">
               <a:rPr lang="en-US" smtClean="0"/>
               <a:pPr/>
-              <a:t>9/9/2020</a:t>
+              <a:t>9/11/2020</a:t>
             </a:fld>
             <a:endParaRPr lang="en-US" dirty="0"/>
           </a:p>
@@ -2069,7 +2069,7 @@
             <a:fld id="{24C0EDFE-3590-4448-BF7B-7FB41E82085F}" type="datetimeFigureOut">
               <a:rPr lang="en-US" smtClean="0"/>
               <a:pPr/>
-              <a:t>9/9/2020</a:t>
+              <a:t>9/11/2020</a:t>
             </a:fld>
             <a:endParaRPr lang="en-US" dirty="0"/>
           </a:p>
@@ -2161,7 +2161,7 @@
             <a:fld id="{24C0EDFE-3590-4448-BF7B-7FB41E82085F}" type="datetimeFigureOut">
               <a:rPr lang="en-US" smtClean="0"/>
               <a:pPr/>
-              <a:t>9/9/2020</a:t>
+              <a:t>9/11/2020</a:t>
             </a:fld>
             <a:endParaRPr lang="en-US" dirty="0"/>
           </a:p>
@@ -2440,7 +2440,7 @@
             <a:fld id="{24C0EDFE-3590-4448-BF7B-7FB41E82085F}" type="datetimeFigureOut">
               <a:rPr lang="en-US" smtClean="0"/>
               <a:pPr/>
-              <a:t>9/9/2020</a:t>
+              <a:t>9/11/2020</a:t>
             </a:fld>
             <a:endParaRPr lang="en-US" dirty="0"/>
           </a:p>
@@ -2692,7 +2692,7 @@
             <a:fld id="{24C0EDFE-3590-4448-BF7B-7FB41E82085F}" type="datetimeFigureOut">
               <a:rPr lang="en-US" smtClean="0"/>
               <a:pPr/>
-              <a:t>9/9/2020</a:t>
+              <a:t>9/11/2020</a:t>
             </a:fld>
             <a:endParaRPr lang="en-US" dirty="0"/>
           </a:p>
@@ -2869,7 +2869,7 @@
             <a:fld id="{24C0EDFE-3590-4448-BF7B-7FB41E82085F}" type="datetimeFigureOut">
               <a:rPr lang="en-US" smtClean="0"/>
               <a:pPr/>
-              <a:t>9/9/2020</a:t>
+              <a:t>9/11/2020</a:t>
             </a:fld>
             <a:endParaRPr lang="en-US" dirty="0"/>
           </a:p>

</xml_diff>